<commit_message>
updated power point slides
</commit_message>
<xml_diff>
--- a/docs/01-overview.pptx
+++ b/docs/01-overview.pptx
@@ -5,16 +5,15 @@
     <p:sldMasterId id="2147483648" r:id="rId1"/>
   </p:sldMasterIdLst>
   <p:notesMasterIdLst>
-    <p:notesMasterId r:id="rId9"/>
+    <p:notesMasterId r:id="rId8"/>
   </p:notesMasterIdLst>
   <p:sldIdLst>
     <p:sldId id="256" r:id="rId2"/>
-    <p:sldId id="261" r:id="rId3"/>
-    <p:sldId id="260" r:id="rId4"/>
-    <p:sldId id="264" r:id="rId5"/>
-    <p:sldId id="258" r:id="rId6"/>
-    <p:sldId id="263" r:id="rId7"/>
-    <p:sldId id="265" r:id="rId8"/>
+    <p:sldId id="260" r:id="rId3"/>
+    <p:sldId id="264" r:id="rId4"/>
+    <p:sldId id="258" r:id="rId5"/>
+    <p:sldId id="263" r:id="rId6"/>
+    <p:sldId id="265" r:id="rId7"/>
   </p:sldIdLst>
   <p:sldSz cx="9144000" cy="6858000" type="screen4x3"/>
   <p:notesSz cx="6858000" cy="9144000"/>
@@ -198,7 +197,7 @@
           <a:p>
             <a:fld id="{D145107B-484A-403F-80AA-E4D9F6831564}" type="datetimeFigureOut">
               <a:rPr lang="en-US" smtClean="0"/>
-              <a:t>5/2/2012</a:t>
+              <a:t>7/9/12</a:t>
             </a:fld>
             <a:endParaRPr lang="en-US"/>
           </a:p>
@@ -531,91 +530,7 @@
           <a:p>
             <a:fld id="{58E76A13-6C6B-44DE-A494-357C31C3825D}" type="slidenum">
               <a:rPr lang="en-US" smtClean="0"/>
-              <a:t>2</a:t>
-            </a:fld>
-            <a:endParaRPr lang="en-US"/>
-          </a:p>
-        </p:txBody>
-      </p:sp>
-    </p:spTree>
-    <p:extLst>
-      <p:ext uri="{BB962C8B-B14F-4D97-AF65-F5344CB8AC3E}">
-        <p14:creationId xmlns:p14="http://schemas.microsoft.com/office/powerpoint/2010/main" val="594245090"/>
-      </p:ext>
-    </p:extLst>
-  </p:cSld>
-  <p:clrMapOvr>
-    <a:masterClrMapping/>
-  </p:clrMapOvr>
-</p:notes>
-</file>
-
-<file path=ppt/notesSlides/notesSlide2.xml><?xml version="1.0" encoding="utf-8"?>
-<p:notes xmlns:a="http://schemas.openxmlformats.org/drawingml/2006/main" xmlns:r="http://schemas.openxmlformats.org/officeDocument/2006/relationships" xmlns:p="http://schemas.openxmlformats.org/presentationml/2006/main">
-  <p:cSld>
-    <p:spTree>
-      <p:nvGrpSpPr>
-        <p:cNvPr id="1" name=""/>
-        <p:cNvGrpSpPr/>
-        <p:nvPr/>
-      </p:nvGrpSpPr>
-      <p:grpSpPr>
-        <a:xfrm>
-          <a:off x="0" y="0"/>
-          <a:ext cx="0" cy="0"/>
-          <a:chOff x="0" y="0"/>
-          <a:chExt cx="0" cy="0"/>
-        </a:xfrm>
-      </p:grpSpPr>
-      <p:sp>
-        <p:nvSpPr>
-          <p:cNvPr id="2" name="Slide Image Placeholder 1"/>
-          <p:cNvSpPr>
-            <a:spLocks noGrp="1" noRot="1" noChangeAspect="1"/>
-          </p:cNvSpPr>
-          <p:nvPr>
-            <p:ph type="sldImg"/>
-          </p:nvPr>
-        </p:nvSpPr>
-        <p:spPr/>
-      </p:sp>
-      <p:sp>
-        <p:nvSpPr>
-          <p:cNvPr id="3" name="Notes Placeholder 2"/>
-          <p:cNvSpPr>
-            <a:spLocks noGrp="1"/>
-          </p:cNvSpPr>
-          <p:nvPr>
-            <p:ph type="body" idx="1"/>
-          </p:nvPr>
-        </p:nvSpPr>
-        <p:spPr/>
-        <p:txBody>
-          <a:bodyPr/>
-          <a:lstStyle/>
-          <a:p>
-            <a:endParaRPr lang="en-US" dirty="0"/>
-          </a:p>
-        </p:txBody>
-      </p:sp>
-      <p:sp>
-        <p:nvSpPr>
-          <p:cNvPr id="4" name="Slide Number Placeholder 3"/>
-          <p:cNvSpPr>
-            <a:spLocks noGrp="1"/>
-          </p:cNvSpPr>
-          <p:nvPr>
-            <p:ph type="sldNum" sz="quarter" idx="10"/>
-          </p:nvPr>
-        </p:nvSpPr>
-        <p:spPr/>
-        <p:txBody>
-          <a:bodyPr/>
-          <a:lstStyle/>
-          <a:p>
-            <a:fld id="{58E76A13-6C6B-44DE-A494-357C31C3825D}" type="slidenum">
-              <a:rPr lang="en-US" smtClean="0"/>
-              <a:t>5</a:t>
+              <a:t>4</a:t>
             </a:fld>
             <a:endParaRPr lang="en-US"/>
           </a:p>
@@ -816,7 +731,7 @@
             <a:fld id="{1D8BD707-D9CF-40AE-B4C6-C98DA3205C09}" type="datetimeFigureOut">
               <a:rPr lang="en-US" smtClean="0"/>
               <a:pPr/>
-              <a:t>5/2/2012</a:t>
+              <a:t>7/9/12</a:t>
             </a:fld>
             <a:endParaRPr lang="en-US"/>
           </a:p>
@@ -983,7 +898,7 @@
             <a:fld id="{1D8BD707-D9CF-40AE-B4C6-C98DA3205C09}" type="datetimeFigureOut">
               <a:rPr lang="en-US" smtClean="0"/>
               <a:pPr/>
-              <a:t>5/2/2012</a:t>
+              <a:t>7/9/12</a:t>
             </a:fld>
             <a:endParaRPr lang="en-US"/>
           </a:p>
@@ -1160,7 +1075,7 @@
             <a:fld id="{1D8BD707-D9CF-40AE-B4C6-C98DA3205C09}" type="datetimeFigureOut">
               <a:rPr lang="en-US" smtClean="0"/>
               <a:pPr/>
-              <a:t>5/2/2012</a:t>
+              <a:t>7/9/12</a:t>
             </a:fld>
             <a:endParaRPr lang="en-US"/>
           </a:p>
@@ -1327,7 +1242,7 @@
             <a:fld id="{1D8BD707-D9CF-40AE-B4C6-C98DA3205C09}" type="datetimeFigureOut">
               <a:rPr lang="en-US" smtClean="0"/>
               <a:pPr/>
-              <a:t>5/2/2012</a:t>
+              <a:t>7/9/12</a:t>
             </a:fld>
             <a:endParaRPr lang="en-US"/>
           </a:p>
@@ -1570,7 +1485,7 @@
             <a:fld id="{1D8BD707-D9CF-40AE-B4C6-C98DA3205C09}" type="datetimeFigureOut">
               <a:rPr lang="en-US" smtClean="0"/>
               <a:pPr/>
-              <a:t>5/2/2012</a:t>
+              <a:t>7/9/12</a:t>
             </a:fld>
             <a:endParaRPr lang="en-US"/>
           </a:p>
@@ -1855,7 +1770,7 @@
             <a:fld id="{1D8BD707-D9CF-40AE-B4C6-C98DA3205C09}" type="datetimeFigureOut">
               <a:rPr lang="en-US" smtClean="0"/>
               <a:pPr/>
-              <a:t>5/2/2012</a:t>
+              <a:t>7/9/12</a:t>
             </a:fld>
             <a:endParaRPr lang="en-US"/>
           </a:p>
@@ -2274,7 +2189,7 @@
             <a:fld id="{1D8BD707-D9CF-40AE-B4C6-C98DA3205C09}" type="datetimeFigureOut">
               <a:rPr lang="en-US" smtClean="0"/>
               <a:pPr/>
-              <a:t>5/2/2012</a:t>
+              <a:t>7/9/12</a:t>
             </a:fld>
             <a:endParaRPr lang="en-US"/>
           </a:p>
@@ -2389,7 +2304,7 @@
             <a:fld id="{1D8BD707-D9CF-40AE-B4C6-C98DA3205C09}" type="datetimeFigureOut">
               <a:rPr lang="en-US" smtClean="0"/>
               <a:pPr/>
-              <a:t>5/2/2012</a:t>
+              <a:t>7/9/12</a:t>
             </a:fld>
             <a:endParaRPr lang="en-US"/>
           </a:p>
@@ -2481,7 +2396,7 @@
             <a:fld id="{1D8BD707-D9CF-40AE-B4C6-C98DA3205C09}" type="datetimeFigureOut">
               <a:rPr lang="en-US" smtClean="0"/>
               <a:pPr/>
-              <a:t>5/2/2012</a:t>
+              <a:t>7/9/12</a:t>
             </a:fld>
             <a:endParaRPr lang="en-US"/>
           </a:p>
@@ -2755,7 +2670,7 @@
             <a:fld id="{1D8BD707-D9CF-40AE-B4C6-C98DA3205C09}" type="datetimeFigureOut">
               <a:rPr lang="en-US" smtClean="0"/>
               <a:pPr/>
-              <a:t>5/2/2012</a:t>
+              <a:t>7/9/12</a:t>
             </a:fld>
             <a:endParaRPr lang="en-US"/>
           </a:p>
@@ -3005,7 +2920,7 @@
             <a:fld id="{1D8BD707-D9CF-40AE-B4C6-C98DA3205C09}" type="datetimeFigureOut">
               <a:rPr lang="en-US" smtClean="0"/>
               <a:pPr/>
-              <a:t>5/2/2012</a:t>
+              <a:t>7/9/12</a:t>
             </a:fld>
             <a:endParaRPr lang="en-US"/>
           </a:p>
@@ -3215,7 +3130,7 @@
             <a:fld id="{1D8BD707-D9CF-40AE-B4C6-C98DA3205C09}" type="datetimeFigureOut">
               <a:rPr lang="en-US" smtClean="0"/>
               <a:pPr/>
-              <a:t>5/2/2012</a:t>
+              <a:t>7/9/12</a:t>
             </a:fld>
             <a:endParaRPr lang="en-US"/>
           </a:p>
@@ -3660,7 +3575,7 @@
   <p:timing>
     <p:tnLst>
       <p:par>
-        <p:cTn id="1" dur="indefinite" restart="never" nodeType="tmRoot"/>
+        <p:cTn xmlns:p14="http://schemas.microsoft.com/office/powerpoint/2010/main" id="1" dur="indefinite" restart="never" nodeType="tmRoot"/>
       </p:par>
     </p:tnLst>
   </p:timing>
@@ -3701,7 +3616,7 @@
           <a:p>
             <a:r>
               <a:rPr lang="en-US" dirty="0" smtClean="0"/>
-              <a:t>Schedule</a:t>
+              <a:t>Class introductions</a:t>
             </a:r>
             <a:endParaRPr lang="en-US" dirty="0"/>
           </a:p>
@@ -3719,202 +3634,80 @@
         </p:nvSpPr>
         <p:spPr/>
         <p:txBody>
-          <a:bodyPr numCol="2">
-            <a:normAutofit/>
-          </a:bodyPr>
+          <a:bodyPr/>
           <a:lstStyle/>
           <a:p>
             <a:r>
               <a:rPr lang="en-US" dirty="0" smtClean="0"/>
-              <a:t>Day </a:t>
+              <a:t>name</a:t>
+            </a:r>
+            <a:r>
+              <a:rPr lang="en-US" dirty="0"/>
+              <a:t>?</a:t>
+            </a:r>
+          </a:p>
+          <a:p>
+            <a:r>
+              <a:rPr lang="en-US" dirty="0"/>
+              <a:t>what do you do?</a:t>
+            </a:r>
+          </a:p>
+          <a:p>
+            <a:r>
+              <a:rPr lang="en-US" dirty="0"/>
+              <a:t>previous experiences relevant to the course</a:t>
             </a:r>
             <a:r>
               <a:rPr lang="en-US" dirty="0" smtClean="0"/>
-              <a:t>1</a:t>
-            </a:r>
-            <a:endParaRPr lang="en-US" dirty="0" smtClean="0"/>
+              <a:t>?</a:t>
+            </a:r>
           </a:p>
           <a:p>
             <a:pPr lvl="1"/>
             <a:r>
               <a:rPr lang="en-US" dirty="0" smtClean="0"/>
-              <a:t>Overview</a:t>
+              <a:t>Android app development?</a:t>
             </a:r>
           </a:p>
           <a:p>
             <a:pPr lvl="1"/>
             <a:r>
               <a:rPr lang="en-US" dirty="0" smtClean="0"/>
-              <a:t>Android Stack</a:t>
+              <a:t>Linux Kernel / Driver development?</a:t>
             </a:r>
           </a:p>
           <a:p>
             <a:pPr lvl="1"/>
             <a:r>
               <a:rPr lang="en-US" dirty="0" smtClean="0"/>
-              <a:t>Android Boot </a:t>
-            </a:r>
-          </a:p>
-          <a:p>
+              <a:t>C / C++?</a:t>
+            </a:r>
+          </a:p>
+          <a:p>
+            <a:pPr lvl="1"/>
             <a:r>
               <a:rPr lang="en-US" dirty="0" smtClean="0"/>
-              <a:t>Day </a:t>
+              <a:t>Java?</a:t>
+            </a:r>
+            <a:endParaRPr lang="en-US" dirty="0"/>
+          </a:p>
+          <a:p>
+            <a:r>
+              <a:rPr lang="en-US" dirty="0"/>
+              <a:t>what do you want to get out of the training</a:t>
             </a:r>
             <a:r>
               <a:rPr lang="en-US" dirty="0" smtClean="0"/>
-              <a:t>2 </a:t>
-            </a:r>
-            <a:r>
-              <a:rPr lang="en-US" dirty="0" smtClean="0"/>
-              <a:t>morning</a:t>
-            </a:r>
-          </a:p>
-          <a:p>
-            <a:pPr lvl="1"/>
-            <a:r>
-              <a:rPr lang="en-US" dirty="0" smtClean="0"/>
-              <a:t>Android JNI</a:t>
-            </a:r>
-            <a:r>
-              <a:rPr lang="en-US" baseline="0" dirty="0" smtClean="0"/>
-              <a:t> &amp;</a:t>
-            </a:r>
-            <a:r>
-              <a:rPr lang="en-US" dirty="0" smtClean="0"/>
-              <a:t> NDK</a:t>
-            </a:r>
-            <a:endParaRPr lang="en-US" dirty="0" smtClean="0"/>
-          </a:p>
-          <a:p>
-            <a:r>
-              <a:rPr lang="en-US" dirty="0" smtClean="0"/>
-              <a:t>Day </a:t>
-            </a:r>
-            <a:r>
-              <a:rPr lang="en-US" dirty="0"/>
-              <a:t>2 </a:t>
-            </a:r>
-            <a:r>
-              <a:rPr lang="en-US" dirty="0" smtClean="0"/>
-              <a:t>afternoon</a:t>
-            </a:r>
-          </a:p>
-          <a:p>
-            <a:pPr lvl="1"/>
-            <a:r>
-              <a:rPr lang="en-US" dirty="0" smtClean="0"/>
-              <a:t>NDK</a:t>
-            </a:r>
-            <a:r>
-              <a:rPr lang="en-US" baseline="0" dirty="0" smtClean="0"/>
-              <a:t> Sable APIs</a:t>
-            </a:r>
-          </a:p>
-          <a:p>
-            <a:pPr lvl="1"/>
-            <a:r>
-              <a:rPr lang="en-US" dirty="0" smtClean="0"/>
-              <a:t>Android</a:t>
-            </a:r>
-            <a:r>
-              <a:rPr lang="en-US" baseline="0" dirty="0" smtClean="0"/>
-              <a:t> Binder + AIDL</a:t>
+              <a:t>?</a:t>
             </a:r>
             <a:endParaRPr lang="en-US" dirty="0"/>
-          </a:p>
-          <a:p>
-            <a:pPr lvl="1"/>
-            <a:r>
-              <a:rPr lang="en-US" dirty="0" smtClean="0"/>
-              <a:t>Building Android </a:t>
-            </a:r>
-          </a:p>
-          <a:p>
-            <a:pPr lvl="0"/>
-            <a:r>
-              <a:rPr lang="en-US" dirty="0" smtClean="0"/>
-              <a:t>Day </a:t>
-            </a:r>
-            <a:r>
-              <a:rPr lang="en-US" dirty="0" smtClean="0"/>
-              <a:t>3 </a:t>
-            </a:r>
-            <a:r>
-              <a:rPr lang="en-US" dirty="0" smtClean="0"/>
-              <a:t>morning</a:t>
-            </a:r>
-          </a:p>
-          <a:p>
-            <a:pPr marL="742950" marR="0" lvl="1" indent="-285750" algn="l" defTabSz="914400" rtl="0" eaLnBrk="1" fontAlgn="auto" latinLnBrk="0" hangingPunct="1">
-              <a:lnSpc>
-                <a:spcPct val="100000"/>
-              </a:lnSpc>
-              <a:spcBef>
-                <a:spcPct val="20000"/>
-              </a:spcBef>
-              <a:spcAft>
-                <a:spcPts val="0"/>
-              </a:spcAft>
-              <a:buClrTx/>
-              <a:buSzTx/>
-              <a:buFont typeface="Arial" pitchFamily="34" charset="0"/>
-              <a:buChar char="–"/>
-              <a:tabLst/>
-              <a:defRPr/>
-            </a:pPr>
-            <a:r>
-              <a:rPr lang="en-US" sz="2800" kern="1200" dirty="0" smtClean="0">
-                <a:solidFill>
-                  <a:schemeClr val="tx1"/>
-                </a:solidFill>
-                <a:effectLst/>
-                <a:latin typeface="+mn-lt"/>
-                <a:ea typeface="+mn-ea"/>
-                <a:cs typeface="+mn-cs"/>
-              </a:rPr>
-              <a:t>Customizing Android</a:t>
-            </a:r>
-            <a:endParaRPr lang="en-US" dirty="0" smtClean="0"/>
-          </a:p>
-          <a:p>
-            <a:r>
-              <a:rPr lang="en-US" dirty="0" smtClean="0"/>
-              <a:t>Day </a:t>
-            </a:r>
-            <a:r>
-              <a:rPr lang="en-US" dirty="0" smtClean="0"/>
-              <a:t>3 </a:t>
-            </a:r>
-            <a:r>
-              <a:rPr lang="en-US" dirty="0" smtClean="0"/>
-              <a:t>afternoon</a:t>
-            </a:r>
-          </a:p>
-          <a:p>
-            <a:pPr lvl="1"/>
-            <a:r>
-              <a:rPr lang="en-US" dirty="0" smtClean="0"/>
-              <a:t>Customizing Android</a:t>
-            </a:r>
-          </a:p>
-          <a:p>
-            <a:pPr lvl="1"/>
-            <a:r>
-              <a:rPr lang="en-US" smtClean="0"/>
-              <a:t>Android Security</a:t>
-            </a:r>
-            <a:endParaRPr lang="en-US" dirty="0" smtClean="0"/>
-          </a:p>
-          <a:p>
-            <a:pPr lvl="1"/>
-            <a:endParaRPr lang="en-US" dirty="0" smtClean="0"/>
           </a:p>
         </p:txBody>
       </p:sp>
     </p:spTree>
     <p:extLst>
       <p:ext uri="{BB962C8B-B14F-4D97-AF65-F5344CB8AC3E}">
-        <p14:creationId xmlns:p14="http://schemas.microsoft.com/office/powerpoint/2010/main" val="3178614768"/>
+        <p14:creationId xmlns:p14="http://schemas.microsoft.com/office/powerpoint/2010/main" val="1243618221"/>
       </p:ext>
     </p:extLst>
   </p:cSld>
@@ -3924,7 +3717,7 @@
   <p:timing>
     <p:tnLst>
       <p:par>
-        <p:cTn id="1" dur="indefinite" restart="never" nodeType="tmRoot"/>
+        <p:cTn xmlns:p14="http://schemas.microsoft.com/office/powerpoint/2010/main" id="1" dur="indefinite" restart="never" nodeType="tmRoot"/>
       </p:par>
     </p:tnLst>
   </p:timing>
@@ -3965,149 +3758,15 @@
           <a:p>
             <a:r>
               <a:rPr lang="en-US" dirty="0" smtClean="0"/>
-              <a:t>Class introductions</a:t>
-            </a:r>
-            <a:endParaRPr lang="en-US" dirty="0"/>
-          </a:p>
-        </p:txBody>
-      </p:sp>
-      <p:sp>
-        <p:nvSpPr>
-          <p:cNvPr id="3" name="Content Placeholder 2"/>
-          <p:cNvSpPr>
-            <a:spLocks noGrp="1"/>
-          </p:cNvSpPr>
-          <p:nvPr>
-            <p:ph idx="1"/>
-          </p:nvPr>
-        </p:nvSpPr>
-        <p:spPr/>
-        <p:txBody>
-          <a:bodyPr/>
-          <a:lstStyle/>
-          <a:p>
+              <a:t>Why is the </a:t>
+            </a:r>
+            <a:r>
+              <a:rPr lang="en-US" smtClean="0"/>
+              <a:t>Android source </a:t>
+            </a:r>
             <a:r>
               <a:rPr lang="en-US" dirty="0" smtClean="0"/>
-              <a:t>name</a:t>
-            </a:r>
-            <a:r>
-              <a:rPr lang="en-US" dirty="0"/>
-              <a:t>?</a:t>
-            </a:r>
-          </a:p>
-          <a:p>
-            <a:r>
-              <a:rPr lang="en-US" dirty="0"/>
-              <a:t>what do you do?</a:t>
-            </a:r>
-          </a:p>
-          <a:p>
-            <a:r>
-              <a:rPr lang="en-US" dirty="0"/>
-              <a:t>previous experiences relevant to the course</a:t>
-            </a:r>
-            <a:r>
-              <a:rPr lang="en-US" dirty="0" smtClean="0"/>
-              <a:t>?</a:t>
-            </a:r>
-          </a:p>
-          <a:p>
-            <a:pPr lvl="1"/>
-            <a:r>
-              <a:rPr lang="en-US" dirty="0" smtClean="0"/>
-              <a:t>Android app development?</a:t>
-            </a:r>
-          </a:p>
-          <a:p>
-            <a:pPr lvl="1"/>
-            <a:r>
-              <a:rPr lang="en-US" dirty="0" smtClean="0"/>
-              <a:t>Linux Kernel / Driver development?</a:t>
-            </a:r>
-          </a:p>
-          <a:p>
-            <a:pPr lvl="1"/>
-            <a:r>
-              <a:rPr lang="en-US" dirty="0" smtClean="0"/>
-              <a:t>C / C++?</a:t>
-            </a:r>
-          </a:p>
-          <a:p>
-            <a:pPr lvl="1"/>
-            <a:r>
-              <a:rPr lang="en-US" dirty="0" smtClean="0"/>
-              <a:t>Java?</a:t>
-            </a:r>
-            <a:endParaRPr lang="en-US" dirty="0"/>
-          </a:p>
-          <a:p>
-            <a:r>
-              <a:rPr lang="en-US" dirty="0"/>
-              <a:t>what do you want to get out of the training</a:t>
-            </a:r>
-            <a:r>
-              <a:rPr lang="en-US" dirty="0" smtClean="0"/>
-              <a:t>?</a:t>
-            </a:r>
-            <a:endParaRPr lang="en-US" dirty="0"/>
-          </a:p>
-        </p:txBody>
-      </p:sp>
-    </p:spTree>
-    <p:extLst>
-      <p:ext uri="{BB962C8B-B14F-4D97-AF65-F5344CB8AC3E}">
-        <p14:creationId xmlns:p14="http://schemas.microsoft.com/office/powerpoint/2010/main" val="1243618221"/>
-      </p:ext>
-    </p:extLst>
-  </p:cSld>
-  <p:clrMapOvr>
-    <a:masterClrMapping/>
-  </p:clrMapOvr>
-  <p:timing>
-    <p:tnLst>
-      <p:par>
-        <p:cTn id="1" dur="indefinite" restart="never" nodeType="tmRoot"/>
-      </p:par>
-    </p:tnLst>
-  </p:timing>
-</p:sld>
-</file>
-
-<file path=ppt/slides/slide4.xml><?xml version="1.0" encoding="utf-8"?>
-<p:sld xmlns:a="http://schemas.openxmlformats.org/drawingml/2006/main" xmlns:r="http://schemas.openxmlformats.org/officeDocument/2006/relationships" xmlns:p="http://schemas.openxmlformats.org/presentationml/2006/main">
-  <p:cSld>
-    <p:spTree>
-      <p:nvGrpSpPr>
-        <p:cNvPr id="1" name=""/>
-        <p:cNvGrpSpPr/>
-        <p:nvPr/>
-      </p:nvGrpSpPr>
-      <p:grpSpPr>
-        <a:xfrm>
-          <a:off x="0" y="0"/>
-          <a:ext cx="0" cy="0"/>
-          <a:chOff x="0" y="0"/>
-          <a:chExt cx="0" cy="0"/>
-        </a:xfrm>
-      </p:grpSpPr>
-      <p:sp>
-        <p:nvSpPr>
-          <p:cNvPr id="2" name="Title 1"/>
-          <p:cNvSpPr>
-            <a:spLocks noGrp="1"/>
-          </p:cNvSpPr>
-          <p:nvPr>
-            <p:ph type="title"/>
-          </p:nvPr>
-        </p:nvSpPr>
-        <p:spPr/>
-        <p:txBody>
-          <a:bodyPr/>
-          <a:lstStyle/>
-          <a:p>
-            <a:r>
-              <a:rPr lang="en-US" dirty="0" smtClean="0"/>
-              <a:t>Why’s it so big?</a:t>
+              <a:t>so big?</a:t>
             </a:r>
             <a:endParaRPr lang="en-US" dirty="0"/>
           </a:p>
@@ -4167,14 +3826,14 @@
           </a:ln>
           <a:effectLst/>
           <a:extLst>
-            <a:ext uri="{909E8E84-426E-40DD-AFC4-6F175D3DCCD1}">
+            <a:ext uri="{909E8E84-426E-40dd-AFC4-6F175D3DCCD1}">
               <a14:hiddenFill xmlns:a14="http://schemas.microsoft.com/office/drawing/2010/main">
                 <a:solidFill>
                   <a:schemeClr val="accent1"/>
                 </a:solidFill>
               </a14:hiddenFill>
             </a:ext>
-            <a:ext uri="{91240B29-F687-4F45-9708-019B960494DF}">
+            <a:ext uri="{91240B29-F687-4f45-9708-019B960494DF}">
               <a14:hiddenLine xmlns:a14="http://schemas.microsoft.com/office/drawing/2010/main" w="9525">
                 <a:solidFill>
                   <a:schemeClr val="tx1"/>
@@ -4184,7 +3843,7 @@
                 <a:tailEnd/>
               </a14:hiddenLine>
             </a:ext>
-            <a:ext uri="{AF507438-7753-43E0-B8FC-AC1667EBCBE1}">
+            <a:ext uri="{AF507438-7753-43e0-B8FC-AC1667EBCBE1}">
               <a14:hiddenEffects xmlns:a14="http://schemas.microsoft.com/office/drawing/2010/main">
                 <a:effectLst>
                   <a:outerShdw dist="35921" dir="2700000" algn="ctr" rotWithShape="0">
@@ -4209,7 +3868,200 @@
   <p:timing>
     <p:tnLst>
       <p:par>
-        <p:cTn id="1" dur="indefinite" restart="never" nodeType="tmRoot"/>
+        <p:cTn xmlns:p14="http://schemas.microsoft.com/office/powerpoint/2010/main" id="1" dur="indefinite" restart="never" nodeType="tmRoot"/>
+      </p:par>
+    </p:tnLst>
+  </p:timing>
+</p:sld>
+</file>
+
+<file path=ppt/slides/slide4.xml><?xml version="1.0" encoding="utf-8"?>
+<p:sld xmlns:a="http://schemas.openxmlformats.org/drawingml/2006/main" xmlns:r="http://schemas.openxmlformats.org/officeDocument/2006/relationships" xmlns:p="http://schemas.openxmlformats.org/presentationml/2006/main">
+  <p:cSld>
+    <p:spTree>
+      <p:nvGrpSpPr>
+        <p:cNvPr id="1" name=""/>
+        <p:cNvGrpSpPr/>
+        <p:nvPr/>
+      </p:nvGrpSpPr>
+      <p:grpSpPr>
+        <a:xfrm>
+          <a:off x="0" y="0"/>
+          <a:ext cx="0" cy="0"/>
+          <a:chOff x="0" y="0"/>
+          <a:chExt cx="0" cy="0"/>
+        </a:xfrm>
+      </p:grpSpPr>
+      <p:sp>
+        <p:nvSpPr>
+          <p:cNvPr id="2" name="Title 1"/>
+          <p:cNvSpPr>
+            <a:spLocks noGrp="1"/>
+          </p:cNvSpPr>
+          <p:nvPr>
+            <p:ph type="title"/>
+          </p:nvPr>
+        </p:nvSpPr>
+        <p:spPr/>
+        <p:txBody>
+          <a:bodyPr/>
+          <a:lstStyle/>
+          <a:p>
+            <a:r>
+              <a:rPr lang="en-US" dirty="0" smtClean="0"/>
+              <a:t>Development Environment Setup</a:t>
+            </a:r>
+            <a:endParaRPr lang="en-US" dirty="0"/>
+          </a:p>
+        </p:txBody>
+      </p:sp>
+      <p:sp>
+        <p:nvSpPr>
+          <p:cNvPr id="3" name="Content Placeholder 2"/>
+          <p:cNvSpPr>
+            <a:spLocks noGrp="1"/>
+          </p:cNvSpPr>
+          <p:nvPr>
+            <p:ph idx="1"/>
+          </p:nvPr>
+        </p:nvSpPr>
+        <p:spPr/>
+        <p:txBody>
+          <a:bodyPr>
+            <a:normAutofit fontScale="92500" lnSpcReduction="10000"/>
+          </a:bodyPr>
+          <a:lstStyle/>
+          <a:p>
+            <a:r>
+              <a:rPr lang="en-US" dirty="0" smtClean="0"/>
+              <a:t>See</a:t>
+            </a:r>
+          </a:p>
+          <a:p>
+            <a:pPr lvl="1"/>
+            <a:r>
+              <a:rPr lang="en-US" sz="2200" dirty="0">
+                <a:hlinkClick r:id="rId3"/>
+              </a:rPr>
+              <a:t>http://</a:t>
+            </a:r>
+            <a:r>
+              <a:rPr lang="en-US" sz="2200" dirty="0" smtClean="0">
+                <a:hlinkClick r:id="rId3"/>
+              </a:rPr>
+              <a:t>marakana.com/support/androidinternals_setup.html</a:t>
+            </a:r>
+            <a:endParaRPr lang="en-US" sz="2200" dirty="0" smtClean="0"/>
+          </a:p>
+          <a:p>
+            <a:r>
+              <a:rPr lang="en-US" dirty="0" smtClean="0"/>
+              <a:t>Alternative 1</a:t>
+            </a:r>
+          </a:p>
+          <a:p>
+            <a:pPr lvl="1"/>
+            <a:r>
+              <a:rPr lang="en-US" dirty="0" smtClean="0"/>
+              <a:t>Install </a:t>
+            </a:r>
+            <a:r>
+              <a:rPr lang="en-US" dirty="0" err="1" smtClean="0"/>
+              <a:t>VMWare</a:t>
+            </a:r>
+            <a:r>
+              <a:rPr lang="en-US" baseline="0" dirty="0" smtClean="0"/>
+              <a:t> Player</a:t>
+            </a:r>
+          </a:p>
+          <a:p>
+            <a:pPr lvl="2"/>
+            <a:r>
+              <a:rPr lang="en-US" baseline="0" dirty="0" smtClean="0"/>
+              <a:t>Any 4.x version of player</a:t>
+            </a:r>
+            <a:endParaRPr lang="en-US" dirty="0" smtClean="0"/>
+          </a:p>
+          <a:p>
+            <a:pPr lvl="2"/>
+            <a:r>
+              <a:rPr lang="en-US" baseline="0" dirty="0" smtClean="0"/>
+              <a:t>You may need to register</a:t>
+            </a:r>
+          </a:p>
+          <a:p>
+            <a:pPr lvl="1"/>
+            <a:r>
+              <a:rPr lang="en-US" dirty="0" smtClean="0"/>
+              <a:t>Load</a:t>
+            </a:r>
+            <a:r>
+              <a:rPr lang="en-US" baseline="0" dirty="0" smtClean="0"/>
+              <a:t> “</a:t>
+            </a:r>
+            <a:r>
+              <a:rPr lang="en-US" baseline="0" dirty="0" err="1" smtClean="0"/>
+              <a:t>Marabuntu</a:t>
+            </a:r>
+            <a:r>
+              <a:rPr lang="en-US" baseline="0" dirty="0" smtClean="0"/>
+              <a:t>” VM</a:t>
+            </a:r>
+          </a:p>
+          <a:p>
+            <a:pPr lvl="0"/>
+            <a:r>
+              <a:rPr lang="en-US" dirty="0" smtClean="0"/>
+              <a:t>Alternative 2</a:t>
+            </a:r>
+          </a:p>
+          <a:p>
+            <a:pPr lvl="1"/>
+            <a:r>
+              <a:rPr lang="en-US" dirty="0" smtClean="0"/>
+              <a:t>Install </a:t>
+            </a:r>
+            <a:r>
+              <a:rPr lang="en-US" dirty="0" smtClean="0">
+                <a:hlinkClick r:id="rId4"/>
+              </a:rPr>
+              <a:t>Ubuntu 10.04</a:t>
+            </a:r>
+            <a:endParaRPr lang="en-US" dirty="0" smtClean="0"/>
+          </a:p>
+          <a:p>
+            <a:pPr lvl="1"/>
+            <a:r>
+              <a:rPr lang="en-US" dirty="0" smtClean="0"/>
+              <a:t>Configure </a:t>
+            </a:r>
+            <a:r>
+              <a:rPr lang="en-US" dirty="0" smtClean="0">
+                <a:hlinkClick r:id="rId5"/>
+              </a:rPr>
+              <a:t>as directed</a:t>
+            </a:r>
+            <a:r>
+              <a:rPr lang="en-US" dirty="0" smtClean="0"/>
+              <a:t> on the Android site.</a:t>
+            </a:r>
+          </a:p>
+        </p:txBody>
+      </p:sp>
+    </p:spTree>
+    <p:extLst>
+      <p:ext uri="{BB962C8B-B14F-4D97-AF65-F5344CB8AC3E}">
+        <p14:creationId xmlns:p14="http://schemas.microsoft.com/office/powerpoint/2010/main" val="4134443773"/>
+      </p:ext>
+    </p:extLst>
+  </p:cSld>
+  <p:clrMapOvr>
+    <a:masterClrMapping/>
+  </p:clrMapOvr>
+  <p:timing>
+    <p:tnLst>
+      <p:par>
+        <p:cTn xmlns:p14="http://schemas.microsoft.com/office/powerpoint/2010/main" id="1" dur="indefinite" restart="never" nodeType="tmRoot"/>
       </p:par>
     </p:tnLst>
   </p:timing>
@@ -4245,14 +4097,15 @@
         </p:nvSpPr>
         <p:spPr/>
         <p:txBody>
-          <a:bodyPr/>
-          <a:lstStyle/>
-          <a:p>
-            <a:r>
-              <a:rPr lang="en-US" dirty="0" smtClean="0"/>
-              <a:t>Development Environment Setup</a:t>
-            </a:r>
-            <a:endParaRPr lang="en-US" dirty="0"/>
+          <a:bodyPr>
+            <a:normAutofit fontScale="90000"/>
+          </a:bodyPr>
+          <a:lstStyle/>
+          <a:p>
+            <a:r>
+              <a:rPr lang="en-US" dirty="0"/>
+              <a:t>Configure BIOS for Hardware Assisted Virtualization (HAV) PCs</a:t>
+            </a:r>
           </a:p>
         </p:txBody>
       </p:sp>
@@ -4274,125 +4127,42 @@
           <a:lstStyle/>
           <a:p>
             <a:r>
-              <a:rPr lang="en-US" dirty="0" smtClean="0"/>
-              <a:t>See</a:t>
-            </a:r>
-          </a:p>
-          <a:p>
-            <a:pPr lvl="1"/>
-            <a:r>
-              <a:rPr lang="en-US" sz="2200" dirty="0">
-                <a:hlinkClick r:id="rId3"/>
+              <a:rPr lang="en-US" dirty="0">
+                <a:hlinkClick r:id="rId2"/>
               </a:rPr>
               <a:t>http://</a:t>
             </a:r>
             <a:r>
-              <a:rPr lang="en-US" sz="2200" dirty="0" smtClean="0">
-                <a:hlinkClick r:id="rId3"/>
+              <a:rPr lang="en-US" dirty="0" smtClean="0">
+                <a:hlinkClick r:id="rId2"/>
               </a:rPr>
-              <a:t>marakana.com/support/androidinternals_setup.html</a:t>
-            </a:r>
-            <a:endParaRPr lang="en-US" sz="2200" dirty="0" smtClean="0"/>
-          </a:p>
-          <a:p>
+              <a:t>goo.gl/5ZP3l</a:t>
+            </a:r>
+            <a:endParaRPr lang="en-US" dirty="0" smtClean="0"/>
+          </a:p>
+          <a:p>
+            <a:r>
+              <a:rPr lang="en-US" dirty="0"/>
+              <a:t>Although OEMs have been shipping hardware virtualization in PCs for three years, hardware virtualization is not available in all PCs—so even if your PC is new, it may not have hardware virtualization. Additionally, those PCs with hardware virtualization have it turned off by default, so you will need to turn on the hardware virtualization capability before you can use it</a:t>
+            </a:r>
             <a:r>
               <a:rPr lang="en-US" dirty="0" smtClean="0"/>
-              <a:t>Alternative 1</a:t>
-            </a:r>
-          </a:p>
-          <a:p>
-            <a:pPr lvl="1"/>
+              <a:t>.</a:t>
+            </a:r>
+          </a:p>
+          <a:p>
             <a:r>
               <a:rPr lang="en-US" dirty="0" smtClean="0"/>
-              <a:t>Install </a:t>
-            </a:r>
-            <a:r>
-              <a:rPr lang="en-US" dirty="0" err="1" smtClean="0"/>
-              <a:t>VMWare</a:t>
-            </a:r>
-            <a:r>
-              <a:rPr lang="en-US" baseline="0" dirty="0" smtClean="0"/>
-              <a:t> Player</a:t>
-            </a:r>
-          </a:p>
-          <a:p>
-            <a:pPr lvl="2"/>
-            <a:r>
-              <a:rPr lang="en-US" baseline="0" dirty="0" smtClean="0"/>
-              <a:t>Any 4.x version of player</a:t>
-            </a:r>
-            <a:endParaRPr lang="en-US" dirty="0" smtClean="0"/>
-          </a:p>
-          <a:p>
-            <a:pPr lvl="2"/>
-            <a:r>
-              <a:rPr lang="en-US" baseline="0" dirty="0" smtClean="0"/>
-              <a:t>You may need to register</a:t>
-            </a:r>
-          </a:p>
-          <a:p>
-            <a:pPr lvl="1"/>
-            <a:r>
-              <a:rPr lang="en-US" dirty="0" smtClean="0"/>
-              <a:t>Load</a:t>
-            </a:r>
-            <a:r>
-              <a:rPr lang="en-US" baseline="0" dirty="0" smtClean="0"/>
-              <a:t> “</a:t>
-            </a:r>
-            <a:r>
-              <a:rPr lang="en-US" baseline="0" dirty="0" err="1" smtClean="0"/>
-              <a:t>Marabuntu</a:t>
-            </a:r>
-            <a:r>
-              <a:rPr lang="en-US" baseline="0" dirty="0" smtClean="0"/>
-              <a:t>” VM</a:t>
-            </a:r>
-          </a:p>
-          <a:p>
-            <a:pPr lvl="0"/>
-            <a:r>
-              <a:rPr lang="en-US" dirty="0" smtClean="0"/>
-              <a:t>Alternative 2</a:t>
-            </a:r>
-          </a:p>
-          <a:p>
-            <a:pPr lvl="1"/>
-            <a:r>
-              <a:rPr lang="en-US" dirty="0" smtClean="0"/>
-              <a:t>Install </a:t>
-            </a:r>
-            <a:r>
-              <a:rPr lang="en-US" dirty="0" smtClean="0">
-                <a:hlinkClick r:id="rId4"/>
-              </a:rPr>
-              <a:t>Ubuntu 10.04</a:t>
-            </a:r>
-            <a:endParaRPr lang="en-US" dirty="0" smtClean="0"/>
-          </a:p>
-          <a:p>
-            <a:pPr lvl="1"/>
-            <a:r>
-              <a:rPr lang="en-US" dirty="0" smtClean="0"/>
-              <a:t>Configure </a:t>
-            </a:r>
-            <a:r>
-              <a:rPr lang="en-US" dirty="0" smtClean="0">
-                <a:hlinkClick r:id="rId5"/>
-              </a:rPr>
-              <a:t>as directed</a:t>
-            </a:r>
-            <a:r>
-              <a:rPr lang="en-US" dirty="0" smtClean="0"/>
-              <a:t> on the Android site.</a:t>
-            </a:r>
+              <a:t>Thanks, Mat!</a:t>
+            </a:r>
+            <a:endParaRPr lang="en-US" dirty="0"/>
           </a:p>
         </p:txBody>
       </p:sp>
     </p:spTree>
     <p:extLst>
       <p:ext uri="{BB962C8B-B14F-4D97-AF65-F5344CB8AC3E}">
-        <p14:creationId xmlns:p14="http://schemas.microsoft.com/office/powerpoint/2010/main" val="4134443773"/>
+        <p14:creationId xmlns:p14="http://schemas.microsoft.com/office/powerpoint/2010/main" val="4091313272"/>
       </p:ext>
     </p:extLst>
   </p:cSld>
@@ -4402,7 +4172,7 @@
   <p:timing>
     <p:tnLst>
       <p:par>
-        <p:cTn id="1" dur="indefinite" restart="never" nodeType="tmRoot"/>
+        <p:cTn xmlns:p14="http://schemas.microsoft.com/office/powerpoint/2010/main" id="1" dur="indefinite" restart="never" nodeType="tmRoot"/>
       </p:par>
     </p:tnLst>
   </p:timing>
@@ -4428,117 +4198,6 @@
       </p:grpSpPr>
       <p:sp>
         <p:nvSpPr>
-          <p:cNvPr id="2" name="Title 1"/>
-          <p:cNvSpPr>
-            <a:spLocks noGrp="1"/>
-          </p:cNvSpPr>
-          <p:nvPr>
-            <p:ph type="title"/>
-          </p:nvPr>
-        </p:nvSpPr>
-        <p:spPr/>
-        <p:txBody>
-          <a:bodyPr>
-            <a:normAutofit fontScale="90000"/>
-          </a:bodyPr>
-          <a:lstStyle/>
-          <a:p>
-            <a:r>
-              <a:rPr lang="en-US" dirty="0"/>
-              <a:t>Configure BIOS for Hardware Assisted Virtualization (HAV) PCs</a:t>
-            </a:r>
-          </a:p>
-        </p:txBody>
-      </p:sp>
-      <p:sp>
-        <p:nvSpPr>
-          <p:cNvPr id="3" name="Content Placeholder 2"/>
-          <p:cNvSpPr>
-            <a:spLocks noGrp="1"/>
-          </p:cNvSpPr>
-          <p:nvPr>
-            <p:ph idx="1"/>
-          </p:nvPr>
-        </p:nvSpPr>
-        <p:spPr/>
-        <p:txBody>
-          <a:bodyPr>
-            <a:normAutofit fontScale="92500" lnSpcReduction="10000"/>
-          </a:bodyPr>
-          <a:lstStyle/>
-          <a:p>
-            <a:r>
-              <a:rPr lang="en-US" dirty="0">
-                <a:hlinkClick r:id="rId2"/>
-              </a:rPr>
-              <a:t>http://</a:t>
-            </a:r>
-            <a:r>
-              <a:rPr lang="en-US" dirty="0" smtClean="0">
-                <a:hlinkClick r:id="rId2"/>
-              </a:rPr>
-              <a:t>goo.gl/5ZP3l</a:t>
-            </a:r>
-            <a:endParaRPr lang="en-US" dirty="0" smtClean="0"/>
-          </a:p>
-          <a:p>
-            <a:r>
-              <a:rPr lang="en-US" dirty="0"/>
-              <a:t>Although OEMs have been shipping hardware virtualization in PCs for three years, hardware virtualization is not available in all PCs—so even if your PC is new, it may not have hardware virtualization. Additionally, those PCs with hardware virtualization have it turned off by default, so you will need to turn on the hardware virtualization capability before you can use it</a:t>
-            </a:r>
-            <a:r>
-              <a:rPr lang="en-US" dirty="0" smtClean="0"/>
-              <a:t>.</a:t>
-            </a:r>
-          </a:p>
-          <a:p>
-            <a:r>
-              <a:rPr lang="en-US" dirty="0" smtClean="0"/>
-              <a:t>Thanks, Mat!</a:t>
-            </a:r>
-            <a:endParaRPr lang="en-US" dirty="0"/>
-          </a:p>
-        </p:txBody>
-      </p:sp>
-    </p:spTree>
-    <p:extLst>
-      <p:ext uri="{BB962C8B-B14F-4D97-AF65-F5344CB8AC3E}">
-        <p14:creationId xmlns:p14="http://schemas.microsoft.com/office/powerpoint/2010/main" val="4091313272"/>
-      </p:ext>
-    </p:extLst>
-  </p:cSld>
-  <p:clrMapOvr>
-    <a:masterClrMapping/>
-  </p:clrMapOvr>
-  <p:timing>
-    <p:tnLst>
-      <p:par>
-        <p:cTn id="1" dur="indefinite" restart="never" nodeType="tmRoot"/>
-      </p:par>
-    </p:tnLst>
-  </p:timing>
-</p:sld>
-</file>
-
-<file path=ppt/slides/slide7.xml><?xml version="1.0" encoding="utf-8"?>
-<p:sld xmlns:a="http://schemas.openxmlformats.org/drawingml/2006/main" xmlns:r="http://schemas.openxmlformats.org/officeDocument/2006/relationships" xmlns:p="http://schemas.openxmlformats.org/presentationml/2006/main">
-  <p:cSld>
-    <p:spTree>
-      <p:nvGrpSpPr>
-        <p:cNvPr id="1" name=""/>
-        <p:cNvGrpSpPr/>
-        <p:nvPr/>
-      </p:nvGrpSpPr>
-      <p:grpSpPr>
-        <a:xfrm>
-          <a:off x="0" y="0"/>
-          <a:ext cx="0" cy="0"/>
-          <a:chOff x="0" y="0"/>
-          <a:chExt cx="0" cy="0"/>
-        </a:xfrm>
-      </p:grpSpPr>
-      <p:sp>
-        <p:nvSpPr>
           <p:cNvPr id="4" name="Title 3"/>
           <p:cNvSpPr>
             <a:spLocks noGrp="1"/>
@@ -4592,7 +4251,7 @@
   <p:timing>
     <p:tnLst>
       <p:par>
-        <p:cTn id="1" dur="indefinite" restart="never" nodeType="tmRoot"/>
+        <p:cTn xmlns:p14="http://schemas.microsoft.com/office/powerpoint/2010/main" id="1" dur="indefinite" restart="never" nodeType="tmRoot"/>
       </p:par>
     </p:tnLst>
   </p:timing>

</xml_diff>